<commit_message>
adding finished restaurant search page
</commit_message>
<xml_diff>
--- a/WireFrames.pptx
+++ b/WireFrames.pptx
@@ -5,7 +5,7 @@
     <p:sldMasterId id="2147483648" r:id="rId1"/>
   </p:sldMasterIdLst>
   <p:notesMasterIdLst>
-    <p:notesMasterId r:id="rId12"/>
+    <p:notesMasterId r:id="rId13"/>
   </p:notesMasterIdLst>
   <p:sldIdLst>
     <p:sldId id="266" r:id="rId2"/>
@@ -18,6 +18,7 @@
     <p:sldId id="259" r:id="rId9"/>
     <p:sldId id="265" r:id="rId10"/>
     <p:sldId id="263" r:id="rId11"/>
+    <p:sldId id="267" r:id="rId12"/>
   </p:sldIdLst>
   <p:sldSz cx="12192000" cy="6858000"/>
   <p:notesSz cx="6858000" cy="9144000"/>
@@ -6859,7 +6860,7 @@
           <a:p>
             <a:fld id="{78229055-1BA0-4DA8-A630-2F5128FC10C0}" type="datetimeFigureOut">
               <a:rPr lang="en-US" smtClean="0"/>
-              <a:t>1/23/2020</a:t>
+              <a:t>1/25/2020</a:t>
             </a:fld>
             <a:endParaRPr lang="en-US"/>
           </a:p>
@@ -7441,7 +7442,7 @@
           <a:p>
             <a:fld id="{AA4655EA-4CC3-45E1-AF12-7E040BD34AB8}" type="datetimeFigureOut">
               <a:rPr lang="en-US" smtClean="0"/>
-              <a:t>1/23/2020</a:t>
+              <a:t>1/25/2020</a:t>
             </a:fld>
             <a:endParaRPr lang="en-US"/>
           </a:p>
@@ -7639,7 +7640,7 @@
           <a:p>
             <a:fld id="{AA4655EA-4CC3-45E1-AF12-7E040BD34AB8}" type="datetimeFigureOut">
               <a:rPr lang="en-US" smtClean="0"/>
-              <a:t>1/23/2020</a:t>
+              <a:t>1/25/2020</a:t>
             </a:fld>
             <a:endParaRPr lang="en-US"/>
           </a:p>
@@ -7847,7 +7848,7 @@
           <a:p>
             <a:fld id="{AA4655EA-4CC3-45E1-AF12-7E040BD34AB8}" type="datetimeFigureOut">
               <a:rPr lang="en-US" smtClean="0"/>
-              <a:t>1/23/2020</a:t>
+              <a:t>1/25/2020</a:t>
             </a:fld>
             <a:endParaRPr lang="en-US"/>
           </a:p>
@@ -8045,7 +8046,7 @@
           <a:p>
             <a:fld id="{AA4655EA-4CC3-45E1-AF12-7E040BD34AB8}" type="datetimeFigureOut">
               <a:rPr lang="en-US" smtClean="0"/>
-              <a:t>1/23/2020</a:t>
+              <a:t>1/25/2020</a:t>
             </a:fld>
             <a:endParaRPr lang="en-US"/>
           </a:p>
@@ -8320,7 +8321,7 @@
           <a:p>
             <a:fld id="{AA4655EA-4CC3-45E1-AF12-7E040BD34AB8}" type="datetimeFigureOut">
               <a:rPr lang="en-US" smtClean="0"/>
-              <a:t>1/23/2020</a:t>
+              <a:t>1/25/2020</a:t>
             </a:fld>
             <a:endParaRPr lang="en-US"/>
           </a:p>
@@ -8585,7 +8586,7 @@
           <a:p>
             <a:fld id="{AA4655EA-4CC3-45E1-AF12-7E040BD34AB8}" type="datetimeFigureOut">
               <a:rPr lang="en-US" smtClean="0"/>
-              <a:t>1/23/2020</a:t>
+              <a:t>1/25/2020</a:t>
             </a:fld>
             <a:endParaRPr lang="en-US"/>
           </a:p>
@@ -8997,7 +8998,7 @@
           <a:p>
             <a:fld id="{AA4655EA-4CC3-45E1-AF12-7E040BD34AB8}" type="datetimeFigureOut">
               <a:rPr lang="en-US" smtClean="0"/>
-              <a:t>1/23/2020</a:t>
+              <a:t>1/25/2020</a:t>
             </a:fld>
             <a:endParaRPr lang="en-US"/>
           </a:p>
@@ -9138,7 +9139,7 @@
           <a:p>
             <a:fld id="{AA4655EA-4CC3-45E1-AF12-7E040BD34AB8}" type="datetimeFigureOut">
               <a:rPr lang="en-US" smtClean="0"/>
-              <a:t>1/23/2020</a:t>
+              <a:t>1/25/2020</a:t>
             </a:fld>
             <a:endParaRPr lang="en-US"/>
           </a:p>
@@ -9251,7 +9252,7 @@
           <a:p>
             <a:fld id="{AA4655EA-4CC3-45E1-AF12-7E040BD34AB8}" type="datetimeFigureOut">
               <a:rPr lang="en-US" smtClean="0"/>
-              <a:t>1/23/2020</a:t>
+              <a:t>1/25/2020</a:t>
             </a:fld>
             <a:endParaRPr lang="en-US"/>
           </a:p>
@@ -9562,7 +9563,7 @@
           <a:p>
             <a:fld id="{AA4655EA-4CC3-45E1-AF12-7E040BD34AB8}" type="datetimeFigureOut">
               <a:rPr lang="en-US" smtClean="0"/>
-              <a:t>1/23/2020</a:t>
+              <a:t>1/25/2020</a:t>
             </a:fld>
             <a:endParaRPr lang="en-US"/>
           </a:p>
@@ -9850,7 +9851,7 @@
           <a:p>
             <a:fld id="{AA4655EA-4CC3-45E1-AF12-7E040BD34AB8}" type="datetimeFigureOut">
               <a:rPr lang="en-US" smtClean="0"/>
-              <a:t>1/23/2020</a:t>
+              <a:t>1/25/2020</a:t>
             </a:fld>
             <a:endParaRPr lang="en-US"/>
           </a:p>
@@ -10091,7 +10092,7 @@
           <a:p>
             <a:fld id="{AA4655EA-4CC3-45E1-AF12-7E040BD34AB8}" type="datetimeFigureOut">
               <a:rPr lang="en-US" smtClean="0"/>
-              <a:t>1/23/2020</a:t>
+              <a:t>1/25/2020</a:t>
             </a:fld>
             <a:endParaRPr lang="en-US"/>
           </a:p>
@@ -11002,6 +11003,14 @@
 <file path=ppt/slides/slide10.xml><?xml version="1.0" encoding="utf-8"?>
 <p:sld xmlns:a="http://schemas.openxmlformats.org/drawingml/2006/main" xmlns:r="http://schemas.openxmlformats.org/officeDocument/2006/relationships" xmlns:p="http://schemas.openxmlformats.org/presentationml/2006/main">
   <p:cSld>
+    <p:bg>
+      <p:bgPr>
+        <a:solidFill>
+          <a:schemeClr val="bg1"/>
+        </a:solidFill>
+        <a:effectLst/>
+      </p:bgPr>
+    </p:bg>
     <p:spTree>
       <p:nvGrpSpPr>
         <p:cNvPr id="1" name=""/>
@@ -11018,6 +11027,136 @@
       </p:grpSpPr>
       <p:sp>
         <p:nvSpPr>
+          <p:cNvPr id="8" name="Rectangle 7">
+            <a:extLst>
+              <a:ext uri="{FF2B5EF4-FFF2-40B4-BE49-F238E27FC236}">
+                <a16:creationId xmlns:a16="http://schemas.microsoft.com/office/drawing/2014/main" id="{4351DFE5-F63D-4BE0-BDA9-E3EB88F01AA5}"/>
+              </a:ext>
+              <a:ext uri="{C183D7F6-B498-43B3-948B-1728B52AA6E4}">
+                <adec:decorative xmlns:adec="http://schemas.microsoft.com/office/drawing/2017/decorative" val="1"/>
+              </a:ext>
+            </a:extLst>
+          </p:cNvPr>
+          <p:cNvSpPr>
+            <a:spLocks noGrp="1" noRot="1" noChangeAspect="1" noMove="1" noResize="1" noEditPoints="1" noAdjustHandles="1" noChangeArrowheads="1" noChangeShapeType="1" noTextEdit="1"/>
+          </p:cNvSpPr>
+          <p:nvPr>
+            <p:extLst>
+              <p:ext uri="{386F3935-93C4-4BCD-93E2-E3B085C9AB24}">
+                <p16:designElem xmlns:p16="http://schemas.microsoft.com/office/powerpoint/2015/main" val="1"/>
+              </p:ext>
+            </p:extLst>
+          </p:nvPr>
+        </p:nvSpPr>
+        <p:spPr>
+          <a:xfrm>
+            <a:off x="355601" y="0"/>
+            <a:ext cx="11480494" cy="2753936"/>
+          </a:xfrm>
+          <a:prstGeom prst="rect">
+            <a:avLst/>
+          </a:prstGeom>
+          <a:gradFill>
+            <a:gsLst>
+              <a:gs pos="0">
+                <a:schemeClr val="accent1">
+                  <a:lumMod val="90000"/>
+                </a:schemeClr>
+              </a:gs>
+              <a:gs pos="25000">
+                <a:schemeClr val="accent1">
+                  <a:lumMod val="90000"/>
+                </a:schemeClr>
+              </a:gs>
+              <a:gs pos="94000">
+                <a:schemeClr val="bg2">
+                  <a:lumMod val="25000"/>
+                </a:schemeClr>
+              </a:gs>
+              <a:gs pos="100000">
+                <a:schemeClr val="bg2">
+                  <a:lumMod val="25000"/>
+                </a:schemeClr>
+              </a:gs>
+            </a:gsLst>
+            <a:lin ang="4200000" scaled="0"/>
+          </a:gradFill>
+          <a:ln>
+            <a:noFill/>
+          </a:ln>
+        </p:spPr>
+        <p:style>
+          <a:lnRef idx="2">
+            <a:schemeClr val="accent1">
+              <a:shade val="50000"/>
+            </a:schemeClr>
+          </a:lnRef>
+          <a:fillRef idx="1">
+            <a:schemeClr val="accent1"/>
+          </a:fillRef>
+          <a:effectRef idx="0">
+            <a:schemeClr val="accent1"/>
+          </a:effectRef>
+          <a:fontRef idx="minor">
+            <a:schemeClr val="lt1"/>
+          </a:fontRef>
+        </p:style>
+        <p:txBody>
+          <a:bodyPr rtlCol="0" anchor="ctr"/>
+          <a:lstStyle/>
+          <a:p>
+            <a:pPr algn="ctr"/>
+            <a:endParaRPr lang="en-US"/>
+          </a:p>
+        </p:txBody>
+      </p:sp>
+      <p:pic>
+        <p:nvPicPr>
+          <p:cNvPr id="10" name="Picture 9">
+            <a:extLst>
+              <a:ext uri="{FF2B5EF4-FFF2-40B4-BE49-F238E27FC236}">
+                <a16:creationId xmlns:a16="http://schemas.microsoft.com/office/drawing/2014/main" id="{3AA16612-ACD2-4A16-8F2B-4514FD6BF28F}"/>
+              </a:ext>
+              <a:ext uri="{C183D7F6-B498-43B3-948B-1728B52AA6E4}">
+                <adec:decorative xmlns:adec="http://schemas.microsoft.com/office/drawing/2017/decorative" val="1"/>
+              </a:ext>
+            </a:extLst>
+          </p:cNvPr>
+          <p:cNvPicPr>
+            <a:picLocks noGrp="1" noRot="1" noChangeAspect="1" noMove="1" noResize="1" noEditPoints="1" noAdjustHandles="1" noChangeArrowheads="1" noChangeShapeType="1" noCrop="1"/>
+          </p:cNvPicPr>
+          <p:nvPr>
+            <p:extLst>
+              <p:ext uri="{386F3935-93C4-4BCD-93E2-E3B085C9AB24}">
+                <p16:designElem xmlns:p16="http://schemas.microsoft.com/office/powerpoint/2015/main" val="1"/>
+              </p:ext>
+            </p:extLst>
+          </p:nvPr>
+        </p:nvPicPr>
+        <p:blipFill>
+          <a:blip r:embed="rId2">
+            <a:extLst>
+              <a:ext uri="{28A0092B-C50C-407E-A947-70E740481C1C}">
+                <a14:useLocalDpi xmlns:a14="http://schemas.microsoft.com/office/drawing/2010/main" val="0"/>
+              </a:ext>
+            </a:extLst>
+          </a:blip>
+          <a:stretch>
+            <a:fillRect/>
+          </a:stretch>
+        </p:blipFill>
+        <p:spPr>
+          <a:xfrm>
+            <a:off x="0" y="0"/>
+            <a:ext cx="12192000" cy="6858000"/>
+          </a:xfrm>
+          <a:prstGeom prst="rect">
+            <a:avLst/>
+          </a:prstGeom>
+        </p:spPr>
+      </p:pic>
+      <p:sp>
+        <p:nvSpPr>
           <p:cNvPr id="2" name="Title 1">
             <a:extLst>
               <a:ext uri="{FF2B5EF4-FFF2-40B4-BE49-F238E27FC236}">
@@ -11032,14 +11171,26 @@
             <p:ph type="title"/>
           </p:nvPr>
         </p:nvSpPr>
-        <p:spPr/>
+        <p:spPr>
+          <a:xfrm>
+            <a:off x="1179226" y="826680"/>
+            <a:ext cx="9833548" cy="1325563"/>
+          </a:xfrm>
+        </p:spPr>
         <p:txBody>
-          <a:bodyPr/>
+          <a:bodyPr>
+            <a:normAutofit/>
+          </a:bodyPr>
           <a:lstStyle/>
           <a:p>
+            <a:pPr algn="ctr"/>
             <a:r>
-              <a:rPr lang="en-US" dirty="0"/>
-              <a:t>Profile Page</a:t>
+              <a:rPr lang="en-US" sz="4000" dirty="0">
+                <a:solidFill>
+                  <a:srgbClr val="FFFFFF"/>
+                </a:solidFill>
+              </a:rPr>
+              <a:t>LEARNINGS</a:t>
             </a:r>
           </a:p>
         </p:txBody>
@@ -11060,12 +11211,23 @@
             <p:ph idx="1"/>
           </p:nvPr>
         </p:nvSpPr>
-        <p:spPr/>
+        <p:spPr>
+          <a:xfrm>
+            <a:off x="1179226" y="3092970"/>
+            <a:ext cx="9833548" cy="2693976"/>
+          </a:xfrm>
+        </p:spPr>
         <p:txBody>
-          <a:bodyPr/>
+          <a:bodyPr>
+            <a:normAutofit/>
+          </a:bodyPr>
           <a:lstStyle/>
           <a:p>
-            <a:endParaRPr lang="en-US"/>
+            <a:endParaRPr lang="en-US" sz="2000" dirty="0">
+              <a:solidFill>
+                <a:srgbClr val="000000"/>
+              </a:solidFill>
+            </a:endParaRPr>
           </a:p>
         </p:txBody>
       </p:sp>
@@ -11073,6 +11235,668 @@
     <p:extLst>
       <p:ext uri="{BB962C8B-B14F-4D97-AF65-F5344CB8AC3E}">
         <p14:creationId xmlns:p14="http://schemas.microsoft.com/office/powerpoint/2010/main" val="1181399118"/>
+      </p:ext>
+    </p:extLst>
+  </p:cSld>
+  <p:clrMapOvr>
+    <a:masterClrMapping/>
+  </p:clrMapOvr>
+</p:sld>
+</file>
+
+<file path=ppt/slides/slide11.xml><?xml version="1.0" encoding="utf-8"?>
+<p:sld xmlns:a="http://schemas.openxmlformats.org/drawingml/2006/main" xmlns:r="http://schemas.openxmlformats.org/officeDocument/2006/relationships" xmlns:p="http://schemas.openxmlformats.org/presentationml/2006/main">
+  <p:cSld>
+    <p:bg>
+      <p:bgPr>
+        <a:solidFill>
+          <a:schemeClr val="bg1"/>
+        </a:solidFill>
+        <a:effectLst/>
+      </p:bgPr>
+    </p:bg>
+    <p:spTree>
+      <p:nvGrpSpPr>
+        <p:cNvPr id="1" name=""/>
+        <p:cNvGrpSpPr/>
+        <p:nvPr/>
+      </p:nvGrpSpPr>
+      <p:grpSpPr>
+        <a:xfrm>
+          <a:off x="0" y="0"/>
+          <a:ext cx="0" cy="0"/>
+          <a:chOff x="0" y="0"/>
+          <a:chExt cx="0" cy="0"/>
+        </a:xfrm>
+      </p:grpSpPr>
+      <p:pic>
+        <p:nvPicPr>
+          <p:cNvPr id="4" name="Content Placeholder 3">
+            <a:extLst>
+              <a:ext uri="{FF2B5EF4-FFF2-40B4-BE49-F238E27FC236}">
+                <a16:creationId xmlns:a16="http://schemas.microsoft.com/office/drawing/2014/main" id="{C833557D-996D-45C2-8EF6-F4299D5A9349}"/>
+              </a:ext>
+            </a:extLst>
+          </p:cNvPr>
+          <p:cNvPicPr>
+            <a:picLocks noGrp="1" noChangeAspect="1"/>
+          </p:cNvPicPr>
+          <p:nvPr>
+            <p:ph idx="1"/>
+          </p:nvPr>
+        </p:nvPicPr>
+        <p:blipFill rotWithShape="1">
+          <a:blip r:embed="rId2"/>
+          <a:srcRect t="23347" r="-1" b="10057"/>
+          <a:stretch/>
+        </p:blipFill>
+        <p:spPr>
+          <a:xfrm>
+            <a:off x="20" y="10"/>
+            <a:ext cx="12009284" cy="6857990"/>
+          </a:xfrm>
+          <a:custGeom>
+            <a:avLst/>
+            <a:gdLst>
+              <a:gd name="connsiteX0" fmla="*/ 8239723 w 12009304"/>
+              <a:gd name="connsiteY0" fmla="*/ 5083103 h 6858000"/>
+              <a:gd name="connsiteX1" fmla="*/ 9505105 w 12009304"/>
+              <a:gd name="connsiteY1" fmla="*/ 5083103 h 6858000"/>
+              <a:gd name="connsiteX2" fmla="*/ 9564676 w 12009304"/>
+              <a:gd name="connsiteY2" fmla="*/ 5091016 h 6858000"/>
+              <a:gd name="connsiteX3" fmla="*/ 9605648 w 12009304"/>
+              <a:gd name="connsiteY3" fmla="*/ 5108194 h 6858000"/>
+              <a:gd name="connsiteX4" fmla="*/ 9580608 w 12009304"/>
+              <a:gd name="connsiteY4" fmla="*/ 5151499 h 6858000"/>
+              <a:gd name="connsiteX5" fmla="*/ 8693486 w 12009304"/>
+              <a:gd name="connsiteY5" fmla="*/ 6685800 h 6858000"/>
+              <a:gd name="connsiteX6" fmla="*/ 8595419 w 12009304"/>
+              <a:gd name="connsiteY6" fmla="*/ 6814017 h 6858000"/>
+              <a:gd name="connsiteX7" fmla="*/ 8545620 w 12009304"/>
+              <a:gd name="connsiteY7" fmla="*/ 6858000 h 6858000"/>
+              <a:gd name="connsiteX8" fmla="*/ 7612173 w 12009304"/>
+              <a:gd name="connsiteY8" fmla="*/ 6858000 h 6858000"/>
+              <a:gd name="connsiteX9" fmla="*/ 7591825 w 12009304"/>
+              <a:gd name="connsiteY9" fmla="*/ 6822959 h 6858000"/>
+              <a:gd name="connsiteX10" fmla="*/ 7411622 w 12009304"/>
+              <a:gd name="connsiteY10" fmla="*/ 6512633 h 6858000"/>
+              <a:gd name="connsiteX11" fmla="*/ 7411622 w 12009304"/>
+              <a:gd name="connsiteY11" fmla="*/ 6289354 h 6858000"/>
+              <a:gd name="connsiteX12" fmla="*/ 8045680 w 12009304"/>
+              <a:gd name="connsiteY12" fmla="*/ 5197465 h 6858000"/>
+              <a:gd name="connsiteX13" fmla="*/ 8239723 w 12009304"/>
+              <a:gd name="connsiteY13" fmla="*/ 5083103 h 6858000"/>
+              <a:gd name="connsiteX14" fmla="*/ 10622296 w 12009304"/>
+              <a:gd name="connsiteY14" fmla="*/ 1326563 h 6858000"/>
+              <a:gd name="connsiteX15" fmla="*/ 11448522 w 12009304"/>
+              <a:gd name="connsiteY15" fmla="*/ 1326563 h 6858000"/>
+              <a:gd name="connsiteX16" fmla="*/ 11577006 w 12009304"/>
+              <a:gd name="connsiteY16" fmla="*/ 1401233 h 6858000"/>
+              <a:gd name="connsiteX17" fmla="*/ 11989228 w 12009304"/>
+              <a:gd name="connsiteY17" fmla="*/ 2114179 h 6858000"/>
+              <a:gd name="connsiteX18" fmla="*/ 11989228 w 12009304"/>
+              <a:gd name="connsiteY18" fmla="*/ 2259969 h 6858000"/>
+              <a:gd name="connsiteX19" fmla="*/ 11577006 w 12009304"/>
+              <a:gd name="connsiteY19" fmla="*/ 2972914 h 6858000"/>
+              <a:gd name="connsiteX20" fmla="*/ 11448522 w 12009304"/>
+              <a:gd name="connsiteY20" fmla="*/ 3047587 h 6858000"/>
+              <a:gd name="connsiteX21" fmla="*/ 10622296 w 12009304"/>
+              <a:gd name="connsiteY21" fmla="*/ 3047587 h 6858000"/>
+              <a:gd name="connsiteX22" fmla="*/ 10495594 w 12009304"/>
+              <a:gd name="connsiteY22" fmla="*/ 2972914 h 6858000"/>
+              <a:gd name="connsiteX23" fmla="*/ 10081589 w 12009304"/>
+              <a:gd name="connsiteY23" fmla="*/ 2259969 h 6858000"/>
+              <a:gd name="connsiteX24" fmla="*/ 10081589 w 12009304"/>
+              <a:gd name="connsiteY24" fmla="*/ 2114179 h 6858000"/>
+              <a:gd name="connsiteX25" fmla="*/ 10495594 w 12009304"/>
+              <a:gd name="connsiteY25" fmla="*/ 1401233 h 6858000"/>
+              <a:gd name="connsiteX26" fmla="*/ 10622296 w 12009304"/>
+              <a:gd name="connsiteY26" fmla="*/ 1326563 h 6858000"/>
+              <a:gd name="connsiteX27" fmla="*/ 0 w 12009304"/>
+              <a:gd name="connsiteY27" fmla="*/ 0 h 6858000"/>
+              <a:gd name="connsiteX28" fmla="*/ 4457990 w 12009304"/>
+              <a:gd name="connsiteY28" fmla="*/ 0 h 6858000"/>
+              <a:gd name="connsiteX29" fmla="*/ 5902610 w 12009304"/>
+              <a:gd name="connsiteY29" fmla="*/ 0 h 6858000"/>
+              <a:gd name="connsiteX30" fmla="*/ 8476869 w 12009304"/>
+              <a:gd name="connsiteY30" fmla="*/ 0 h 6858000"/>
+              <a:gd name="connsiteX31" fmla="*/ 8535933 w 12009304"/>
+              <a:gd name="connsiteY31" fmla="*/ 39849 h 6858000"/>
+              <a:gd name="connsiteX32" fmla="*/ 8693486 w 12009304"/>
+              <a:gd name="connsiteY32" fmla="*/ 220603 h 6858000"/>
+              <a:gd name="connsiteX33" fmla="*/ 10389180 w 12009304"/>
+              <a:gd name="connsiteY33" fmla="*/ 3153347 h 6858000"/>
+              <a:gd name="connsiteX34" fmla="*/ 10389180 w 12009304"/>
+              <a:gd name="connsiteY34" fmla="*/ 3753061 h 6858000"/>
+              <a:gd name="connsiteX35" fmla="*/ 9759557 w 12009304"/>
+              <a:gd name="connsiteY35" fmla="*/ 4842009 h 6858000"/>
+              <a:gd name="connsiteX36" fmla="*/ 9706493 w 12009304"/>
+              <a:gd name="connsiteY36" fmla="*/ 4933778 h 6858000"/>
+              <a:gd name="connsiteX37" fmla="*/ 9708360 w 12009304"/>
+              <a:gd name="connsiteY37" fmla="*/ 4934561 h 6858000"/>
+              <a:gd name="connsiteX38" fmla="*/ 9802002 w 12009304"/>
+              <a:gd name="connsiteY38" fmla="*/ 5029008 h 6858000"/>
+              <a:gd name="connsiteX39" fmla="*/ 10514131 w 12009304"/>
+              <a:gd name="connsiteY39" fmla="*/ 6260653 h 6858000"/>
+              <a:gd name="connsiteX40" fmla="*/ 10514131 w 12009304"/>
+              <a:gd name="connsiteY40" fmla="*/ 6512512 h 6858000"/>
+              <a:gd name="connsiteX41" fmla="*/ 10340271 w 12009304"/>
+              <a:gd name="connsiteY41" fmla="*/ 6813206 h 6858000"/>
+              <a:gd name="connsiteX42" fmla="*/ 10314372 w 12009304"/>
+              <a:gd name="connsiteY42" fmla="*/ 6858000 h 6858000"/>
+              <a:gd name="connsiteX43" fmla="*/ 10119136 w 12009304"/>
+              <a:gd name="connsiteY43" fmla="*/ 6858000 h 6858000"/>
+              <a:gd name="connsiteX44" fmla="*/ 10122008 w 12009304"/>
+              <a:gd name="connsiteY44" fmla="*/ 6853033 h 6858000"/>
+              <a:gd name="connsiteX45" fmla="*/ 10327158 w 12009304"/>
+              <a:gd name="connsiteY45" fmla="*/ 6498223 h 6858000"/>
+              <a:gd name="connsiteX46" fmla="*/ 10327158 w 12009304"/>
+              <a:gd name="connsiteY46" fmla="*/ 6274942 h 6858000"/>
+              <a:gd name="connsiteX47" fmla="*/ 9695832 w 12009304"/>
+              <a:gd name="connsiteY47" fmla="*/ 5183053 h 6858000"/>
+              <a:gd name="connsiteX48" fmla="*/ 9612819 w 12009304"/>
+              <a:gd name="connsiteY48" fmla="*/ 5099323 h 6858000"/>
+              <a:gd name="connsiteX49" fmla="*/ 9603213 w 12009304"/>
+              <a:gd name="connsiteY49" fmla="*/ 5095298 h 6858000"/>
+              <a:gd name="connsiteX50" fmla="*/ 9654707 w 12009304"/>
+              <a:gd name="connsiteY50" fmla="*/ 5006238 h 6858000"/>
+              <a:gd name="connsiteX51" fmla="*/ 9693004 w 12009304"/>
+              <a:gd name="connsiteY51" fmla="*/ 4940002 h 6858000"/>
+              <a:gd name="connsiteX52" fmla="*/ 9653283 w 12009304"/>
+              <a:gd name="connsiteY52" fmla="*/ 4923348 h 6858000"/>
+              <a:gd name="connsiteX53" fmla="*/ 9586087 w 12009304"/>
+              <a:gd name="connsiteY53" fmla="*/ 4914420 h 6858000"/>
+              <a:gd name="connsiteX54" fmla="*/ 8158743 w 12009304"/>
+              <a:gd name="connsiteY54" fmla="*/ 4914420 h 6858000"/>
+              <a:gd name="connsiteX55" fmla="*/ 7939863 w 12009304"/>
+              <a:gd name="connsiteY55" fmla="*/ 5043420 h 6858000"/>
+              <a:gd name="connsiteX56" fmla="*/ 7224650 w 12009304"/>
+              <a:gd name="connsiteY56" fmla="*/ 6275065 h 6858000"/>
+              <a:gd name="connsiteX57" fmla="*/ 7224650 w 12009304"/>
+              <a:gd name="connsiteY57" fmla="*/ 6526922 h 6858000"/>
+              <a:gd name="connsiteX58" fmla="*/ 7350544 w 12009304"/>
+              <a:gd name="connsiteY58" fmla="*/ 6743723 h 6858000"/>
+              <a:gd name="connsiteX59" fmla="*/ 7416905 w 12009304"/>
+              <a:gd name="connsiteY59" fmla="*/ 6858000 h 6858000"/>
+              <a:gd name="connsiteX60" fmla="*/ 5902610 w 12009304"/>
+              <a:gd name="connsiteY60" fmla="*/ 6858000 h 6858000"/>
+              <a:gd name="connsiteX61" fmla="*/ 4389358 w 12009304"/>
+              <a:gd name="connsiteY61" fmla="*/ 6858000 h 6858000"/>
+              <a:gd name="connsiteX62" fmla="*/ 0 w 12009304"/>
+              <a:gd name="connsiteY62" fmla="*/ 6858000 h 6858000"/>
+            </a:gdLst>
+            <a:ahLst/>
+            <a:cxnLst>
+              <a:cxn ang="0">
+                <a:pos x="connsiteX0" y="connsiteY0"/>
+              </a:cxn>
+              <a:cxn ang="0">
+                <a:pos x="connsiteX1" y="connsiteY1"/>
+              </a:cxn>
+              <a:cxn ang="0">
+                <a:pos x="connsiteX2" y="connsiteY2"/>
+              </a:cxn>
+              <a:cxn ang="0">
+                <a:pos x="connsiteX3" y="connsiteY3"/>
+              </a:cxn>
+              <a:cxn ang="0">
+                <a:pos x="connsiteX4" y="connsiteY4"/>
+              </a:cxn>
+              <a:cxn ang="0">
+                <a:pos x="connsiteX5" y="connsiteY5"/>
+              </a:cxn>
+              <a:cxn ang="0">
+                <a:pos x="connsiteX6" y="connsiteY6"/>
+              </a:cxn>
+              <a:cxn ang="0">
+                <a:pos x="connsiteX7" y="connsiteY7"/>
+              </a:cxn>
+              <a:cxn ang="0">
+                <a:pos x="connsiteX8" y="connsiteY8"/>
+              </a:cxn>
+              <a:cxn ang="0">
+                <a:pos x="connsiteX9" y="connsiteY9"/>
+              </a:cxn>
+              <a:cxn ang="0">
+                <a:pos x="connsiteX10" y="connsiteY10"/>
+              </a:cxn>
+              <a:cxn ang="0">
+                <a:pos x="connsiteX11" y="connsiteY11"/>
+              </a:cxn>
+              <a:cxn ang="0">
+                <a:pos x="connsiteX12" y="connsiteY12"/>
+              </a:cxn>
+              <a:cxn ang="0">
+                <a:pos x="connsiteX13" y="connsiteY13"/>
+              </a:cxn>
+              <a:cxn ang="0">
+                <a:pos x="connsiteX14" y="connsiteY14"/>
+              </a:cxn>
+              <a:cxn ang="0">
+                <a:pos x="connsiteX15" y="connsiteY15"/>
+              </a:cxn>
+              <a:cxn ang="0">
+                <a:pos x="connsiteX16" y="connsiteY16"/>
+              </a:cxn>
+              <a:cxn ang="0">
+                <a:pos x="connsiteX17" y="connsiteY17"/>
+              </a:cxn>
+              <a:cxn ang="0">
+                <a:pos x="connsiteX18" y="connsiteY18"/>
+              </a:cxn>
+              <a:cxn ang="0">
+                <a:pos x="connsiteX19" y="connsiteY19"/>
+              </a:cxn>
+              <a:cxn ang="0">
+                <a:pos x="connsiteX20" y="connsiteY20"/>
+              </a:cxn>
+              <a:cxn ang="0">
+                <a:pos x="connsiteX21" y="connsiteY21"/>
+              </a:cxn>
+              <a:cxn ang="0">
+                <a:pos x="connsiteX22" y="connsiteY22"/>
+              </a:cxn>
+              <a:cxn ang="0">
+                <a:pos x="connsiteX23" y="connsiteY23"/>
+              </a:cxn>
+              <a:cxn ang="0">
+                <a:pos x="connsiteX24" y="connsiteY24"/>
+              </a:cxn>
+              <a:cxn ang="0">
+                <a:pos x="connsiteX25" y="connsiteY25"/>
+              </a:cxn>
+              <a:cxn ang="0">
+                <a:pos x="connsiteX26" y="connsiteY26"/>
+              </a:cxn>
+              <a:cxn ang="0">
+                <a:pos x="connsiteX27" y="connsiteY27"/>
+              </a:cxn>
+              <a:cxn ang="0">
+                <a:pos x="connsiteX28" y="connsiteY28"/>
+              </a:cxn>
+              <a:cxn ang="0">
+                <a:pos x="connsiteX29" y="connsiteY29"/>
+              </a:cxn>
+              <a:cxn ang="0">
+                <a:pos x="connsiteX30" y="connsiteY30"/>
+              </a:cxn>
+              <a:cxn ang="0">
+                <a:pos x="connsiteX31" y="connsiteY31"/>
+              </a:cxn>
+              <a:cxn ang="0">
+                <a:pos x="connsiteX32" y="connsiteY32"/>
+              </a:cxn>
+              <a:cxn ang="0">
+                <a:pos x="connsiteX33" y="connsiteY33"/>
+              </a:cxn>
+              <a:cxn ang="0">
+                <a:pos x="connsiteX34" y="connsiteY34"/>
+              </a:cxn>
+              <a:cxn ang="0">
+                <a:pos x="connsiteX35" y="connsiteY35"/>
+              </a:cxn>
+              <a:cxn ang="0">
+                <a:pos x="connsiteX36" y="connsiteY36"/>
+              </a:cxn>
+              <a:cxn ang="0">
+                <a:pos x="connsiteX37" y="connsiteY37"/>
+              </a:cxn>
+              <a:cxn ang="0">
+                <a:pos x="connsiteX38" y="connsiteY38"/>
+              </a:cxn>
+              <a:cxn ang="0">
+                <a:pos x="connsiteX39" y="connsiteY39"/>
+              </a:cxn>
+              <a:cxn ang="0">
+                <a:pos x="connsiteX40" y="connsiteY40"/>
+              </a:cxn>
+              <a:cxn ang="0">
+                <a:pos x="connsiteX41" y="connsiteY41"/>
+              </a:cxn>
+              <a:cxn ang="0">
+                <a:pos x="connsiteX42" y="connsiteY42"/>
+              </a:cxn>
+              <a:cxn ang="0">
+                <a:pos x="connsiteX43" y="connsiteY43"/>
+              </a:cxn>
+              <a:cxn ang="0">
+                <a:pos x="connsiteX44" y="connsiteY44"/>
+              </a:cxn>
+              <a:cxn ang="0">
+                <a:pos x="connsiteX45" y="connsiteY45"/>
+              </a:cxn>
+              <a:cxn ang="0">
+                <a:pos x="connsiteX46" y="connsiteY46"/>
+              </a:cxn>
+              <a:cxn ang="0">
+                <a:pos x="connsiteX47" y="connsiteY47"/>
+              </a:cxn>
+              <a:cxn ang="0">
+                <a:pos x="connsiteX48" y="connsiteY48"/>
+              </a:cxn>
+              <a:cxn ang="0">
+                <a:pos x="connsiteX49" y="connsiteY49"/>
+              </a:cxn>
+              <a:cxn ang="0">
+                <a:pos x="connsiteX50" y="connsiteY50"/>
+              </a:cxn>
+              <a:cxn ang="0">
+                <a:pos x="connsiteX51" y="connsiteY51"/>
+              </a:cxn>
+              <a:cxn ang="0">
+                <a:pos x="connsiteX52" y="connsiteY52"/>
+              </a:cxn>
+              <a:cxn ang="0">
+                <a:pos x="connsiteX53" y="connsiteY53"/>
+              </a:cxn>
+              <a:cxn ang="0">
+                <a:pos x="connsiteX54" y="connsiteY54"/>
+              </a:cxn>
+              <a:cxn ang="0">
+                <a:pos x="connsiteX55" y="connsiteY55"/>
+              </a:cxn>
+              <a:cxn ang="0">
+                <a:pos x="connsiteX56" y="connsiteY56"/>
+              </a:cxn>
+              <a:cxn ang="0">
+                <a:pos x="connsiteX57" y="connsiteY57"/>
+              </a:cxn>
+              <a:cxn ang="0">
+                <a:pos x="connsiteX58" y="connsiteY58"/>
+              </a:cxn>
+              <a:cxn ang="0">
+                <a:pos x="connsiteX59" y="connsiteY59"/>
+              </a:cxn>
+              <a:cxn ang="0">
+                <a:pos x="connsiteX60" y="connsiteY60"/>
+              </a:cxn>
+              <a:cxn ang="0">
+                <a:pos x="connsiteX61" y="connsiteY61"/>
+              </a:cxn>
+              <a:cxn ang="0">
+                <a:pos x="connsiteX62" y="connsiteY62"/>
+              </a:cxn>
+            </a:cxnLst>
+            <a:rect l="l" t="t" r="r" b="b"/>
+            <a:pathLst>
+              <a:path w="12009304" h="6858000">
+                <a:moveTo>
+                  <a:pt x="8239723" y="5083103"/>
+                </a:moveTo>
+                <a:cubicBezTo>
+                  <a:pt x="8239723" y="5083103"/>
+                  <a:pt x="8239723" y="5083103"/>
+                  <a:pt x="9505105" y="5083103"/>
+                </a:cubicBezTo>
+                <a:cubicBezTo>
+                  <a:pt x="9525601" y="5083103"/>
+                  <a:pt x="9545588" y="5085825"/>
+                  <a:pt x="9564676" y="5091016"/>
+                </a:cubicBezTo>
+                <a:lnTo>
+                  <a:pt x="9605648" y="5108194"/>
+                </a:lnTo>
+                <a:lnTo>
+                  <a:pt x="9580608" y="5151499"/>
+                </a:lnTo>
+                <a:cubicBezTo>
+                  <a:pt x="9354208" y="5543062"/>
+                  <a:pt x="9064418" y="6044264"/>
+                  <a:pt x="8693486" y="6685800"/>
+                </a:cubicBezTo>
+                <a:cubicBezTo>
+                  <a:pt x="8665958" y="6733339"/>
+                  <a:pt x="8632925" y="6776306"/>
+                  <a:pt x="8595419" y="6814017"/>
+                </a:cubicBezTo>
+                <a:lnTo>
+                  <a:pt x="8545620" y="6858000"/>
+                </a:lnTo>
+                <a:lnTo>
+                  <a:pt x="7612173" y="6858000"/>
+                </a:lnTo>
+                <a:lnTo>
+                  <a:pt x="7591825" y="6822959"/>
+                </a:lnTo>
+                <a:cubicBezTo>
+                  <a:pt x="7538315" y="6730809"/>
+                  <a:pt x="7478495" y="6627794"/>
+                  <a:pt x="7411622" y="6512633"/>
+                </a:cubicBezTo>
+                <a:cubicBezTo>
+                  <a:pt x="7370628" y="6444560"/>
+                  <a:pt x="7370628" y="6357427"/>
+                  <a:pt x="7411622" y="6289354"/>
+                </a:cubicBezTo>
+                <a:cubicBezTo>
+                  <a:pt x="7411622" y="6289354"/>
+                  <a:pt x="7411622" y="6289354"/>
+                  <a:pt x="8045680" y="5197465"/>
+                </a:cubicBezTo>
+                <a:cubicBezTo>
+                  <a:pt x="8083943" y="5126669"/>
+                  <a:pt x="8160465" y="5083103"/>
+                  <a:pt x="8239723" y="5083103"/>
+                </a:cubicBezTo>
+                <a:close/>
+                <a:moveTo>
+                  <a:pt x="10622296" y="1326563"/>
+                </a:moveTo>
+                <a:cubicBezTo>
+                  <a:pt x="10622296" y="1326563"/>
+                  <a:pt x="10622296" y="1326563"/>
+                  <a:pt x="11448522" y="1326563"/>
+                </a:cubicBezTo>
+                <a:cubicBezTo>
+                  <a:pt x="11502058" y="1326563"/>
+                  <a:pt x="11550238" y="1355009"/>
+                  <a:pt x="11577006" y="1401233"/>
+                </a:cubicBezTo>
+                <a:cubicBezTo>
+                  <a:pt x="11577006" y="1401233"/>
+                  <a:pt x="11577006" y="1401233"/>
+                  <a:pt x="11989228" y="2114179"/>
+                </a:cubicBezTo>
+                <a:cubicBezTo>
+                  <a:pt x="12015996" y="2158629"/>
+                  <a:pt x="12015996" y="2215522"/>
+                  <a:pt x="11989228" y="2259969"/>
+                </a:cubicBezTo>
+                <a:cubicBezTo>
+                  <a:pt x="11989228" y="2259969"/>
+                  <a:pt x="11989228" y="2259969"/>
+                  <a:pt x="11577006" y="2972914"/>
+                </a:cubicBezTo>
+                <a:cubicBezTo>
+                  <a:pt x="11550238" y="3019141"/>
+                  <a:pt x="11502058" y="3047587"/>
+                  <a:pt x="11448522" y="3047587"/>
+                </a:cubicBezTo>
+                <a:cubicBezTo>
+                  <a:pt x="11448522" y="3047587"/>
+                  <a:pt x="11448522" y="3047587"/>
+                  <a:pt x="10622296" y="3047587"/>
+                </a:cubicBezTo>
+                <a:cubicBezTo>
+                  <a:pt x="10570544" y="3047587"/>
+                  <a:pt x="10520578" y="3019141"/>
+                  <a:pt x="10495594" y="2972914"/>
+                </a:cubicBezTo>
+                <a:cubicBezTo>
+                  <a:pt x="10495594" y="2972914"/>
+                  <a:pt x="10495594" y="2972914"/>
+                  <a:pt x="10081589" y="2259969"/>
+                </a:cubicBezTo>
+                <a:cubicBezTo>
+                  <a:pt x="10054821" y="2215522"/>
+                  <a:pt x="10054821" y="2158629"/>
+                  <a:pt x="10081589" y="2114179"/>
+                </a:cubicBezTo>
+                <a:cubicBezTo>
+                  <a:pt x="10081589" y="2114179"/>
+                  <a:pt x="10081589" y="2114179"/>
+                  <a:pt x="10495594" y="1401233"/>
+                </a:cubicBezTo>
+                <a:cubicBezTo>
+                  <a:pt x="10520578" y="1355009"/>
+                  <a:pt x="10570544" y="1326563"/>
+                  <a:pt x="10622296" y="1326563"/>
+                </a:cubicBezTo>
+                <a:close/>
+                <a:moveTo>
+                  <a:pt x="0" y="0"/>
+                </a:moveTo>
+                <a:lnTo>
+                  <a:pt x="4457990" y="0"/>
+                </a:lnTo>
+                <a:lnTo>
+                  <a:pt x="5902610" y="0"/>
+                </a:lnTo>
+                <a:lnTo>
+                  <a:pt x="8476869" y="0"/>
+                </a:lnTo>
+                <a:lnTo>
+                  <a:pt x="8535933" y="39849"/>
+                </a:lnTo>
+                <a:cubicBezTo>
+                  <a:pt x="8598516" y="88273"/>
+                  <a:pt x="8652195" y="149296"/>
+                  <a:pt x="8693486" y="220603"/>
+                </a:cubicBezTo>
+                <a:cubicBezTo>
+                  <a:pt x="8693486" y="220603"/>
+                  <a:pt x="8693486" y="220603"/>
+                  <a:pt x="10389180" y="3153347"/>
+                </a:cubicBezTo>
+                <a:cubicBezTo>
+                  <a:pt x="10499291" y="3336185"/>
+                  <a:pt x="10499291" y="3570221"/>
+                  <a:pt x="10389180" y="3753061"/>
+                </a:cubicBezTo>
+                <a:cubicBezTo>
+                  <a:pt x="10389180" y="3753061"/>
+                  <a:pt x="10389180" y="3753061"/>
+                  <a:pt x="9759557" y="4842009"/>
+                </a:cubicBezTo>
+                <a:lnTo>
+                  <a:pt x="9706493" y="4933778"/>
+                </a:lnTo>
+                <a:lnTo>
+                  <a:pt x="9708360" y="4934561"/>
+                </a:lnTo>
+                <a:cubicBezTo>
+                  <a:pt x="9746510" y="4956830"/>
+                  <a:pt x="9778880" y="4989078"/>
+                  <a:pt x="9802002" y="5029008"/>
+                </a:cubicBezTo>
+                <a:cubicBezTo>
+                  <a:pt x="9802002" y="5029008"/>
+                  <a:pt x="9802002" y="5029008"/>
+                  <a:pt x="10514131" y="6260653"/>
+                </a:cubicBezTo>
+                <a:cubicBezTo>
+                  <a:pt x="10560376" y="6337439"/>
+                  <a:pt x="10560376" y="6435725"/>
+                  <a:pt x="10514131" y="6512512"/>
+                </a:cubicBezTo>
+                <a:cubicBezTo>
+                  <a:pt x="10514131" y="6512512"/>
+                  <a:pt x="10514131" y="6512512"/>
+                  <a:pt x="10340271" y="6813206"/>
+                </a:cubicBezTo>
+                <a:lnTo>
+                  <a:pt x="10314372" y="6858000"/>
+                </a:lnTo>
+                <a:lnTo>
+                  <a:pt x="10119136" y="6858000"/>
+                </a:lnTo>
+                <a:lnTo>
+                  <a:pt x="10122008" y="6853033"/>
+                </a:lnTo>
+                <a:cubicBezTo>
+                  <a:pt x="10327158" y="6498223"/>
+                  <a:pt x="10327158" y="6498223"/>
+                  <a:pt x="10327158" y="6498223"/>
+                </a:cubicBezTo>
+                <a:cubicBezTo>
+                  <a:pt x="10368154" y="6430148"/>
+                  <a:pt x="10368154" y="6343015"/>
+                  <a:pt x="10327158" y="6274942"/>
+                </a:cubicBezTo>
+                <a:cubicBezTo>
+                  <a:pt x="9695832" y="5183053"/>
+                  <a:pt x="9695832" y="5183053"/>
+                  <a:pt x="9695832" y="5183053"/>
+                </a:cubicBezTo>
+                <a:cubicBezTo>
+                  <a:pt x="9675334" y="5147654"/>
+                  <a:pt x="9646640" y="5119063"/>
+                  <a:pt x="9612819" y="5099323"/>
+                </a:cubicBezTo>
+                <a:lnTo>
+                  <a:pt x="9603213" y="5095298"/>
+                </a:lnTo>
+                <a:lnTo>
+                  <a:pt x="9654707" y="5006238"/>
+                </a:lnTo>
+                <a:lnTo>
+                  <a:pt x="9693004" y="4940002"/>
+                </a:lnTo>
+                <a:lnTo>
+                  <a:pt x="9653283" y="4923348"/>
+                </a:lnTo>
+                <a:cubicBezTo>
+                  <a:pt x="9631750" y="4917491"/>
+                  <a:pt x="9609208" y="4914420"/>
+                  <a:pt x="9586087" y="4914420"/>
+                </a:cubicBezTo>
+                <a:cubicBezTo>
+                  <a:pt x="8158743" y="4914420"/>
+                  <a:pt x="8158743" y="4914420"/>
+                  <a:pt x="8158743" y="4914420"/>
+                </a:cubicBezTo>
+                <a:cubicBezTo>
+                  <a:pt x="8069341" y="4914420"/>
+                  <a:pt x="7983024" y="4963563"/>
+                  <a:pt x="7939863" y="5043420"/>
+                </a:cubicBezTo>
+                <a:cubicBezTo>
+                  <a:pt x="7224650" y="6275065"/>
+                  <a:pt x="7224650" y="6275065"/>
+                  <a:pt x="7224650" y="6275065"/>
+                </a:cubicBezTo>
+                <a:cubicBezTo>
+                  <a:pt x="7178407" y="6351849"/>
+                  <a:pt x="7178407" y="6450135"/>
+                  <a:pt x="7224650" y="6526922"/>
+                </a:cubicBezTo>
+                <a:cubicBezTo>
+                  <a:pt x="7269350" y="6603900"/>
+                  <a:pt x="7311257" y="6676067"/>
+                  <a:pt x="7350544" y="6743723"/>
+                </a:cubicBezTo>
+                <a:lnTo>
+                  <a:pt x="7416905" y="6858000"/>
+                </a:lnTo>
+                <a:lnTo>
+                  <a:pt x="5902610" y="6858000"/>
+                </a:lnTo>
+                <a:lnTo>
+                  <a:pt x="4389358" y="6858000"/>
+                </a:lnTo>
+                <a:lnTo>
+                  <a:pt x="0" y="6858000"/>
+                </a:lnTo>
+                <a:close/>
+              </a:path>
+            </a:pathLst>
+          </a:custGeom>
+        </p:spPr>
+      </p:pic>
+    </p:spTree>
+    <p:extLst>
+      <p:ext uri="{BB962C8B-B14F-4D97-AF65-F5344CB8AC3E}">
+        <p14:creationId xmlns:p14="http://schemas.microsoft.com/office/powerpoint/2010/main" val="2340477385"/>
       </p:ext>
     </p:extLst>
   </p:cSld>

</xml_diff>

<commit_message>
made address linkable to Google Maps
</commit_message>
<xml_diff>
--- a/WireFrames.pptx
+++ b/WireFrames.pptx
@@ -10894,6 +10894,447 @@
           </a:p>
         </p:txBody>
       </p:sp>
+      <p:sp>
+        <p:nvSpPr>
+          <p:cNvPr id="4" name="Rectangle 3">
+            <a:extLst>
+              <a:ext uri="{FF2B5EF4-FFF2-40B4-BE49-F238E27FC236}">
+                <a16:creationId xmlns:a16="http://schemas.microsoft.com/office/drawing/2014/main" id="{E9C4E7A2-51FF-43F3-867B-784457F553E0}"/>
+              </a:ext>
+            </a:extLst>
+          </p:cNvPr>
+          <p:cNvSpPr/>
+          <p:nvPr/>
+        </p:nvSpPr>
+        <p:spPr>
+          <a:xfrm>
+            <a:off x="7934639" y="4874437"/>
+            <a:ext cx="3849758" cy="1252806"/>
+          </a:xfrm>
+          <a:prstGeom prst="rect">
+            <a:avLst/>
+          </a:prstGeom>
+        </p:spPr>
+        <p:style>
+          <a:lnRef idx="2">
+            <a:schemeClr val="accent1">
+              <a:shade val="50000"/>
+            </a:schemeClr>
+          </a:lnRef>
+          <a:fillRef idx="1">
+            <a:schemeClr val="accent1"/>
+          </a:fillRef>
+          <a:effectRef idx="0">
+            <a:schemeClr val="accent1"/>
+          </a:effectRef>
+          <a:fontRef idx="minor">
+            <a:schemeClr val="lt1"/>
+          </a:fontRef>
+        </p:style>
+        <p:txBody>
+          <a:bodyPr rtlCol="0" anchor="ctr"/>
+          <a:lstStyle/>
+          <a:p>
+            <a:pPr algn="ctr"/>
+            <a:endParaRPr lang="en-US" dirty="0"/>
+          </a:p>
+          <a:p>
+            <a:pPr algn="ctr"/>
+            <a:endParaRPr lang="en-US" dirty="0"/>
+          </a:p>
+        </p:txBody>
+      </p:sp>
+      <p:sp>
+        <p:nvSpPr>
+          <p:cNvPr id="6" name="TextBox 5">
+            <a:extLst>
+              <a:ext uri="{FF2B5EF4-FFF2-40B4-BE49-F238E27FC236}">
+                <a16:creationId xmlns:a16="http://schemas.microsoft.com/office/drawing/2014/main" id="{C2820C98-1553-4E29-89CF-857A60EC052C}"/>
+              </a:ext>
+            </a:extLst>
+          </p:cNvPr>
+          <p:cNvSpPr txBox="1"/>
+          <p:nvPr/>
+        </p:nvSpPr>
+        <p:spPr>
+          <a:xfrm>
+            <a:off x="7935241" y="1256261"/>
+            <a:ext cx="3849758" cy="789323"/>
+          </a:xfrm>
+          <a:prstGeom prst="rect">
+            <a:avLst/>
+          </a:prstGeom>
+          <a:solidFill>
+            <a:schemeClr val="accent1"/>
+          </a:solidFill>
+        </p:spPr>
+        <p:txBody>
+          <a:bodyPr wrap="square" rtlCol="0">
+            <a:spAutoFit/>
+          </a:bodyPr>
+          <a:lstStyle/>
+          <a:p>
+            <a:endParaRPr lang="en-US" dirty="0"/>
+          </a:p>
+        </p:txBody>
+      </p:sp>
+      <p:sp>
+        <p:nvSpPr>
+          <p:cNvPr id="7" name="Rectangle 6">
+            <a:extLst>
+              <a:ext uri="{FF2B5EF4-FFF2-40B4-BE49-F238E27FC236}">
+                <a16:creationId xmlns:a16="http://schemas.microsoft.com/office/drawing/2014/main" id="{533914AA-567E-46F8-82AB-9CE358E21432}"/>
+              </a:ext>
+            </a:extLst>
+          </p:cNvPr>
+          <p:cNvSpPr/>
+          <p:nvPr/>
+        </p:nvSpPr>
+        <p:spPr>
+          <a:xfrm>
+            <a:off x="7935843" y="1256261"/>
+            <a:ext cx="3849758" cy="4870982"/>
+          </a:xfrm>
+          <a:prstGeom prst="rect">
+            <a:avLst/>
+          </a:prstGeom>
+          <a:noFill/>
+          <a:ln>
+            <a:solidFill>
+              <a:schemeClr val="tx1"/>
+            </a:solidFill>
+          </a:ln>
+        </p:spPr>
+        <p:style>
+          <a:lnRef idx="2">
+            <a:schemeClr val="accent6"/>
+          </a:lnRef>
+          <a:fillRef idx="1">
+            <a:schemeClr val="lt1"/>
+          </a:fillRef>
+          <a:effectRef idx="0">
+            <a:schemeClr val="accent6"/>
+          </a:effectRef>
+          <a:fontRef idx="minor">
+            <a:schemeClr val="dk1"/>
+          </a:fontRef>
+        </p:style>
+        <p:txBody>
+          <a:bodyPr rtlCol="0" anchor="ctr"/>
+          <a:lstStyle/>
+          <a:p>
+            <a:pPr algn="ctr"/>
+            <a:endParaRPr lang="en-US"/>
+          </a:p>
+        </p:txBody>
+      </p:sp>
+      <p:sp>
+        <p:nvSpPr>
+          <p:cNvPr id="8" name="TextBox 7">
+            <a:extLst>
+              <a:ext uri="{FF2B5EF4-FFF2-40B4-BE49-F238E27FC236}">
+                <a16:creationId xmlns:a16="http://schemas.microsoft.com/office/drawing/2014/main" id="{A0D50056-5C10-4974-A422-0F2E85F72992}"/>
+              </a:ext>
+            </a:extLst>
+          </p:cNvPr>
+          <p:cNvSpPr txBox="1"/>
+          <p:nvPr/>
+        </p:nvSpPr>
+        <p:spPr>
+          <a:xfrm>
+            <a:off x="7934639" y="1389312"/>
+            <a:ext cx="3850361" cy="523220"/>
+          </a:xfrm>
+          <a:prstGeom prst="rect">
+            <a:avLst/>
+          </a:prstGeom>
+          <a:noFill/>
+        </p:spPr>
+        <p:txBody>
+          <a:bodyPr wrap="square" rtlCol="0">
+            <a:spAutoFit/>
+          </a:bodyPr>
+          <a:lstStyle/>
+          <a:p>
+            <a:pPr algn="ctr"/>
+            <a:r>
+              <a:rPr lang="en-US" sz="2800" dirty="0">
+                <a:solidFill>
+                  <a:schemeClr val="bg1"/>
+                </a:solidFill>
+              </a:rPr>
+              <a:t>[Type] Recipes</a:t>
+            </a:r>
+          </a:p>
+        </p:txBody>
+      </p:sp>
+      <p:sp>
+        <p:nvSpPr>
+          <p:cNvPr id="9" name="TextBox 8">
+            <a:extLst>
+              <a:ext uri="{FF2B5EF4-FFF2-40B4-BE49-F238E27FC236}">
+                <a16:creationId xmlns:a16="http://schemas.microsoft.com/office/drawing/2014/main" id="{768B73E3-A01B-4538-AB6E-29E0E69F0061}"/>
+              </a:ext>
+            </a:extLst>
+          </p:cNvPr>
+          <p:cNvSpPr txBox="1"/>
+          <p:nvPr/>
+        </p:nvSpPr>
+        <p:spPr>
+          <a:xfrm>
+            <a:off x="8213757" y="2376018"/>
+            <a:ext cx="2806148" cy="646331"/>
+          </a:xfrm>
+          <a:prstGeom prst="rect">
+            <a:avLst/>
+          </a:prstGeom>
+          <a:noFill/>
+        </p:spPr>
+        <p:txBody>
+          <a:bodyPr wrap="square" rtlCol="0">
+            <a:spAutoFit/>
+          </a:bodyPr>
+          <a:lstStyle/>
+          <a:p>
+            <a:r>
+              <a:rPr lang="en-US" dirty="0"/>
+              <a:t>Dish name</a:t>
+            </a:r>
+          </a:p>
+          <a:p>
+            <a:r>
+              <a:rPr lang="en-US" u="sng" dirty="0">
+                <a:solidFill>
+                  <a:srgbClr val="00B0F0"/>
+                </a:solidFill>
+              </a:rPr>
+              <a:t>recipe</a:t>
+            </a:r>
+          </a:p>
+        </p:txBody>
+      </p:sp>
+      <p:sp>
+        <p:nvSpPr>
+          <p:cNvPr id="11" name="TextBox 10">
+            <a:extLst>
+              <a:ext uri="{FF2B5EF4-FFF2-40B4-BE49-F238E27FC236}">
+                <a16:creationId xmlns:a16="http://schemas.microsoft.com/office/drawing/2014/main" id="{8092754E-0212-4B33-9FFA-328795C75D14}"/>
+              </a:ext>
+            </a:extLst>
+          </p:cNvPr>
+          <p:cNvSpPr txBox="1"/>
+          <p:nvPr/>
+        </p:nvSpPr>
+        <p:spPr>
+          <a:xfrm>
+            <a:off x="10483585" y="4994719"/>
+            <a:ext cx="873441" cy="338554"/>
+          </a:xfrm>
+          <a:prstGeom prst="rect">
+            <a:avLst/>
+          </a:prstGeom>
+          <a:solidFill>
+            <a:schemeClr val="bg2">
+              <a:lumMod val="75000"/>
+            </a:schemeClr>
+          </a:solidFill>
+          <a:ln>
+            <a:solidFill>
+              <a:schemeClr val="bg2">
+                <a:lumMod val="25000"/>
+              </a:schemeClr>
+            </a:solidFill>
+          </a:ln>
+        </p:spPr>
+        <p:txBody>
+          <a:bodyPr wrap="square" rtlCol="0">
+            <a:spAutoFit/>
+          </a:bodyPr>
+          <a:lstStyle/>
+          <a:p>
+            <a:pPr algn="ctr"/>
+            <a:r>
+              <a:rPr lang="en-US" sz="1600" dirty="0"/>
+              <a:t>Profile</a:t>
+            </a:r>
+            <a:endParaRPr lang="en-US" dirty="0"/>
+          </a:p>
+        </p:txBody>
+      </p:sp>
+      <p:sp>
+        <p:nvSpPr>
+          <p:cNvPr id="12" name="TextBox 11">
+            <a:extLst>
+              <a:ext uri="{FF2B5EF4-FFF2-40B4-BE49-F238E27FC236}">
+                <a16:creationId xmlns:a16="http://schemas.microsoft.com/office/drawing/2014/main" id="{B1213E40-455A-4CF1-B9BF-7C486C7D7F5F}"/>
+              </a:ext>
+            </a:extLst>
+          </p:cNvPr>
+          <p:cNvSpPr txBox="1"/>
+          <p:nvPr/>
+        </p:nvSpPr>
+        <p:spPr>
+          <a:xfrm>
+            <a:off x="8213757" y="5007489"/>
+            <a:ext cx="826539" cy="369332"/>
+          </a:xfrm>
+          <a:prstGeom prst="rect">
+            <a:avLst/>
+          </a:prstGeom>
+          <a:solidFill>
+            <a:schemeClr val="bg1"/>
+          </a:solidFill>
+          <a:ln>
+            <a:solidFill>
+              <a:schemeClr val="bg2">
+                <a:lumMod val="25000"/>
+              </a:schemeClr>
+            </a:solidFill>
+          </a:ln>
+        </p:spPr>
+        <p:txBody>
+          <a:bodyPr wrap="square" rtlCol="0">
+            <a:spAutoFit/>
+          </a:bodyPr>
+          <a:lstStyle/>
+          <a:p>
+            <a:pPr algn="ctr"/>
+            <a:r>
+              <a:rPr lang="en-US" dirty="0"/>
+              <a:t>Home</a:t>
+            </a:r>
+          </a:p>
+        </p:txBody>
+      </p:sp>
+      <p:sp>
+        <p:nvSpPr>
+          <p:cNvPr id="13" name="Rectangle 12">
+            <a:extLst>
+              <a:ext uri="{FF2B5EF4-FFF2-40B4-BE49-F238E27FC236}">
+                <a16:creationId xmlns:a16="http://schemas.microsoft.com/office/drawing/2014/main" id="{005311E8-ADAC-4EEC-AB77-9A86DD70A2C6}"/>
+              </a:ext>
+            </a:extLst>
+          </p:cNvPr>
+          <p:cNvSpPr/>
+          <p:nvPr/>
+        </p:nvSpPr>
+        <p:spPr>
+          <a:xfrm>
+            <a:off x="8817305" y="5639771"/>
+            <a:ext cx="1934727" cy="369332"/>
+          </a:xfrm>
+          <a:prstGeom prst="rect">
+            <a:avLst/>
+          </a:prstGeom>
+        </p:spPr>
+        <p:txBody>
+          <a:bodyPr wrap="square">
+            <a:spAutoFit/>
+          </a:bodyPr>
+          <a:lstStyle/>
+          <a:p>
+            <a:pPr algn="ctr"/>
+            <a:r>
+              <a:rPr lang="en-US" dirty="0">
+                <a:solidFill>
+                  <a:schemeClr val="bg1"/>
+                </a:solidFill>
+              </a:rPr>
+              <a:t>craving it!</a:t>
+            </a:r>
+          </a:p>
+        </p:txBody>
+      </p:sp>
+      <p:sp>
+        <p:nvSpPr>
+          <p:cNvPr id="14" name="TextBox 13">
+            <a:extLst>
+              <a:ext uri="{FF2B5EF4-FFF2-40B4-BE49-F238E27FC236}">
+                <a16:creationId xmlns:a16="http://schemas.microsoft.com/office/drawing/2014/main" id="{F6100009-C83F-469D-9956-A0FAFC96410B}"/>
+              </a:ext>
+            </a:extLst>
+          </p:cNvPr>
+          <p:cNvSpPr txBox="1"/>
+          <p:nvPr/>
+        </p:nvSpPr>
+        <p:spPr>
+          <a:xfrm>
+            <a:off x="8224710" y="3070319"/>
+            <a:ext cx="2806148" cy="646331"/>
+          </a:xfrm>
+          <a:prstGeom prst="rect">
+            <a:avLst/>
+          </a:prstGeom>
+          <a:noFill/>
+        </p:spPr>
+        <p:txBody>
+          <a:bodyPr wrap="square" rtlCol="0">
+            <a:spAutoFit/>
+          </a:bodyPr>
+          <a:lstStyle/>
+          <a:p>
+            <a:r>
+              <a:rPr lang="en-US" dirty="0"/>
+              <a:t>Dish name</a:t>
+            </a:r>
+          </a:p>
+          <a:p>
+            <a:r>
+              <a:rPr lang="en-US" u="sng" dirty="0">
+                <a:solidFill>
+                  <a:srgbClr val="00B0F0"/>
+                </a:solidFill>
+              </a:rPr>
+              <a:t>recipe</a:t>
+            </a:r>
+          </a:p>
+        </p:txBody>
+      </p:sp>
+      <p:sp>
+        <p:nvSpPr>
+          <p:cNvPr id="15" name="TextBox 14">
+            <a:extLst>
+              <a:ext uri="{FF2B5EF4-FFF2-40B4-BE49-F238E27FC236}">
+                <a16:creationId xmlns:a16="http://schemas.microsoft.com/office/drawing/2014/main" id="{1AFC759B-5109-4204-B1DD-46FEBAF9FCE2}"/>
+              </a:ext>
+            </a:extLst>
+          </p:cNvPr>
+          <p:cNvSpPr txBox="1"/>
+          <p:nvPr/>
+        </p:nvSpPr>
+        <p:spPr>
+          <a:xfrm>
+            <a:off x="8224710" y="3746947"/>
+            <a:ext cx="2806148" cy="646331"/>
+          </a:xfrm>
+          <a:prstGeom prst="rect">
+            <a:avLst/>
+          </a:prstGeom>
+          <a:noFill/>
+        </p:spPr>
+        <p:txBody>
+          <a:bodyPr wrap="square" rtlCol="0">
+            <a:spAutoFit/>
+          </a:bodyPr>
+          <a:lstStyle/>
+          <a:p>
+            <a:r>
+              <a:rPr lang="en-US" dirty="0"/>
+              <a:t>Dish name</a:t>
+            </a:r>
+          </a:p>
+          <a:p>
+            <a:r>
+              <a:rPr lang="en-US" u="sng" dirty="0">
+                <a:solidFill>
+                  <a:srgbClr val="00B0F0"/>
+                </a:solidFill>
+              </a:rPr>
+              <a:t>recipe</a:t>
+            </a:r>
+          </a:p>
+        </p:txBody>
+      </p:sp>
     </p:spTree>
     <p:extLst>
       <p:ext uri="{BB962C8B-B14F-4D97-AF65-F5344CB8AC3E}">
@@ -11061,7 +11502,7 @@
         <p:spPr>
           <a:xfrm>
             <a:off x="596901" y="1086445"/>
-            <a:ext cx="6160258" cy="4801314"/>
+            <a:ext cx="6160258" cy="5078313"/>
           </a:xfrm>
           <a:prstGeom prst="rect">
             <a:avLst/>
@@ -11084,6 +11525,41 @@
           </a:p>
           <a:p>
             <a:r>
+              <a:rPr lang="en-US" b="1" dirty="0"/>
+              <a:t>AS </a:t>
+            </a:r>
+            <a:r>
+              <a:rPr lang="en-US" dirty="0"/>
+              <a:t>someone who likes to cook</a:t>
+            </a:r>
+            <a:br>
+              <a:rPr lang="en-US" dirty="0"/>
+            </a:br>
+            <a:r>
+              <a:rPr lang="en-US" b="1" dirty="0"/>
+              <a:t>I WANT TO </a:t>
+            </a:r>
+            <a:r>
+              <a:rPr lang="en-US" dirty="0"/>
+              <a:t>see the ingredients and instructions of a specific dish</a:t>
+            </a:r>
+            <a:br>
+              <a:rPr lang="en-US" dirty="0"/>
+            </a:br>
+            <a:r>
+              <a:rPr lang="en-US" b="1" dirty="0"/>
+              <a:t>SO THAT I CAN </a:t>
+            </a:r>
+            <a:r>
+              <a:rPr lang="en-US" dirty="0"/>
+              <a:t>cook it</a:t>
+            </a:r>
+          </a:p>
+          <a:p>
+            <a:endParaRPr lang="en-US" dirty="0"/>
+          </a:p>
+          <a:p>
+            <a:r>
               <a:rPr lang="en-US" dirty="0"/>
               <a:t>A page that provides a picture of the dish, the list of ingredients needed with their quantities and instructions on how to cook it.</a:t>
             </a:r>
@@ -11135,22 +11611,6 @@
               <a:rPr lang="en-US" dirty="0"/>
               <a:t>Embedded YouTube video for how to cook the recipe</a:t>
             </a:r>
-          </a:p>
-          <a:p>
-            <a:pPr marL="285750" indent="-285750">
-              <a:buFont typeface="Arial" panose="020B0604020202020204" pitchFamily="34" charset="0"/>
-              <a:buChar char="•"/>
-            </a:pPr>
-            <a:endParaRPr lang="en-US" dirty="0"/>
-          </a:p>
-          <a:p>
-            <a:endParaRPr lang="en-US" dirty="0"/>
-          </a:p>
-          <a:p>
-            <a:endParaRPr lang="en-US" dirty="0"/>
-          </a:p>
-          <a:p>
-            <a:endParaRPr lang="en-US" dirty="0"/>
           </a:p>
         </p:txBody>
       </p:sp>
@@ -11959,7 +12419,7 @@
         <p:spPr>
           <a:xfrm>
             <a:off x="972152" y="1164663"/>
-            <a:ext cx="6585634" cy="5632311"/>
+            <a:ext cx="6585634" cy="5355312"/>
           </a:xfrm>
           <a:prstGeom prst="rect">
             <a:avLst/>
@@ -11982,17 +12442,59 @@
           </a:p>
           <a:p>
             <a:r>
-              <a:rPr lang="en-US" dirty="0"/>
-              <a:t>Lists of restaurant based on the cuisine type selected within their area code.</a:t>
+              <a:rPr lang="en-US" b="1" dirty="0"/>
+              <a:t>AS A </a:t>
             </a:r>
-          </a:p>
-          <a:p>
-            <a:endParaRPr lang="en-US" dirty="0"/>
-          </a:p>
-          <a:p>
             <a:r>
               <a:rPr lang="en-US" dirty="0"/>
-              <a:t>MVP: list of x number of results within x miles of their area code.  Lists the restaurant name and URL to restaurant’s website or yelp page.</a:t>
+              <a:t>someone who is looking for something to eat</a:t>
+            </a:r>
+            <a:br>
+              <a:rPr lang="en-US" dirty="0"/>
+            </a:br>
+            <a:r>
+              <a:rPr lang="en-US" b="1" dirty="0"/>
+              <a:t>I WANT TO </a:t>
+            </a:r>
+            <a:r>
+              <a:rPr lang="en-US" dirty="0"/>
+              <a:t>see a list of restaurants in my area based on cuisine type I selected </a:t>
+            </a:r>
+            <a:br>
+              <a:rPr lang="en-US" dirty="0"/>
+            </a:br>
+            <a:r>
+              <a:rPr lang="en-US" b="1" dirty="0"/>
+              <a:t>SO THAT </a:t>
+            </a:r>
+            <a:r>
+              <a:rPr lang="en-US" dirty="0"/>
+              <a:t>I can decide on where to eat</a:t>
+            </a:r>
+          </a:p>
+          <a:p>
+            <a:endParaRPr lang="en-US" dirty="0"/>
+          </a:p>
+          <a:p>
+            <a:r>
+              <a:rPr lang="en-US" dirty="0"/>
+              <a:t>MVP: Lists of 10 restaurant based on the cuisine type selected within 25 miles of their location (</a:t>
+            </a:r>
+            <a:r>
+              <a:rPr lang="en-US" dirty="0" err="1"/>
+              <a:t>lat</a:t>
+            </a:r>
+            <a:r>
+              <a:rPr lang="en-US" dirty="0"/>
+              <a:t> &amp; </a:t>
+            </a:r>
+            <a:r>
+              <a:rPr lang="en-US" dirty="0" err="1"/>
+              <a:t>lng</a:t>
+            </a:r>
+            <a:r>
+              <a:rPr lang="en-US" dirty="0"/>
+              <a:t>). </a:t>
             </a:r>
           </a:p>
           <a:p>
@@ -12040,6 +12542,16 @@
             </a:pPr>
             <a:r>
               <a:rPr lang="en-US" dirty="0"/>
+              <a:t>URL to restaurant’s website or yelp page.</a:t>
+            </a:r>
+          </a:p>
+          <a:p>
+            <a:pPr marL="285750" indent="-285750">
+              <a:buFont typeface="Arial" panose="020B0604020202020204" pitchFamily="34" charset="0"/>
+              <a:buChar char="•"/>
+            </a:pPr>
+            <a:r>
+              <a:rPr lang="en-US" dirty="0"/>
               <a:t>Navigation to Profile Page</a:t>
             </a:r>
           </a:p>
@@ -12062,19 +12574,6 @@
               <a:rPr lang="en-US" dirty="0"/>
               <a:t>Clicking address navigates user to Google map </a:t>
             </a:r>
-          </a:p>
-          <a:p>
-            <a:pPr marL="285750" indent="-285750">
-              <a:buFont typeface="Arial" panose="020B0604020202020204" pitchFamily="34" charset="0"/>
-              <a:buChar char="•"/>
-            </a:pPr>
-            <a:endParaRPr lang="en-US" dirty="0"/>
-          </a:p>
-          <a:p>
-            <a:endParaRPr lang="en-US" dirty="0"/>
-          </a:p>
-          <a:p>
-            <a:endParaRPr lang="en-US" dirty="0"/>
           </a:p>
         </p:txBody>
       </p:sp>
@@ -12644,7 +13143,7 @@
         <p:spPr>
           <a:xfrm>
             <a:off x="956496" y="1363847"/>
-            <a:ext cx="6160258" cy="3416320"/>
+            <a:ext cx="6160258" cy="4524315"/>
           </a:xfrm>
           <a:prstGeom prst="rect">
             <a:avLst/>
@@ -12659,7 +13158,41 @@
           <a:p>
             <a:r>
               <a:rPr lang="en-US" dirty="0"/>
-              <a:t>Navigation: Welcome &gt; x</a:t>
+              <a:t>Navigation: Welcome &gt; Recipe Search &gt; Recipe Results</a:t>
+            </a:r>
+          </a:p>
+          <a:p>
+            <a:endParaRPr lang="en-US" dirty="0"/>
+          </a:p>
+          <a:p>
+            <a:r>
+              <a:rPr lang="en-US" b="1" dirty="0"/>
+              <a:t>AS A </a:t>
+            </a:r>
+            <a:r>
+              <a:rPr lang="en-US" dirty="0"/>
+              <a:t>someone who likes to cook</a:t>
+            </a:r>
+            <a:br>
+              <a:rPr lang="en-US" dirty="0"/>
+            </a:br>
+            <a:r>
+              <a:rPr lang="en-US" b="1" dirty="0"/>
+              <a:t>I WANT TO </a:t>
+            </a:r>
+            <a:r>
+              <a:rPr lang="en-US" dirty="0"/>
+              <a:t>be able to save a recipe</a:t>
+            </a:r>
+          </a:p>
+          <a:p>
+            <a:r>
+              <a:rPr lang="en-US" b="1" dirty="0"/>
+              <a:t>SO THAT I CAN</a:t>
+            </a:r>
+            <a:r>
+              <a:rPr lang="en-US" dirty="0"/>
+              <a:t> easily find and cook the recipe later</a:t>
             </a:r>
           </a:p>
           <a:p>
@@ -12708,6 +13241,447 @@
           </a:p>
           <a:p>
             <a:endParaRPr lang="en-US" dirty="0"/>
+          </a:p>
+        </p:txBody>
+      </p:sp>
+      <p:sp>
+        <p:nvSpPr>
+          <p:cNvPr id="4" name="Rectangle 3">
+            <a:extLst>
+              <a:ext uri="{FF2B5EF4-FFF2-40B4-BE49-F238E27FC236}">
+                <a16:creationId xmlns:a16="http://schemas.microsoft.com/office/drawing/2014/main" id="{4B3D7561-1959-4F49-A9BA-6023896726B6}"/>
+              </a:ext>
+            </a:extLst>
+          </p:cNvPr>
+          <p:cNvSpPr/>
+          <p:nvPr/>
+        </p:nvSpPr>
+        <p:spPr>
+          <a:xfrm>
+            <a:off x="7934639" y="4874437"/>
+            <a:ext cx="3849758" cy="1252806"/>
+          </a:xfrm>
+          <a:prstGeom prst="rect">
+            <a:avLst/>
+          </a:prstGeom>
+        </p:spPr>
+        <p:style>
+          <a:lnRef idx="2">
+            <a:schemeClr val="accent1">
+              <a:shade val="50000"/>
+            </a:schemeClr>
+          </a:lnRef>
+          <a:fillRef idx="1">
+            <a:schemeClr val="accent1"/>
+          </a:fillRef>
+          <a:effectRef idx="0">
+            <a:schemeClr val="accent1"/>
+          </a:effectRef>
+          <a:fontRef idx="minor">
+            <a:schemeClr val="lt1"/>
+          </a:fontRef>
+        </p:style>
+        <p:txBody>
+          <a:bodyPr rtlCol="0" anchor="ctr"/>
+          <a:lstStyle/>
+          <a:p>
+            <a:pPr algn="ctr"/>
+            <a:endParaRPr lang="en-US" dirty="0"/>
+          </a:p>
+          <a:p>
+            <a:pPr algn="ctr"/>
+            <a:endParaRPr lang="en-US" dirty="0"/>
+          </a:p>
+        </p:txBody>
+      </p:sp>
+      <p:sp>
+        <p:nvSpPr>
+          <p:cNvPr id="6" name="TextBox 5">
+            <a:extLst>
+              <a:ext uri="{FF2B5EF4-FFF2-40B4-BE49-F238E27FC236}">
+                <a16:creationId xmlns:a16="http://schemas.microsoft.com/office/drawing/2014/main" id="{ADEED9F8-9B7D-4767-B376-76B36FB6DCB4}"/>
+              </a:ext>
+            </a:extLst>
+          </p:cNvPr>
+          <p:cNvSpPr txBox="1"/>
+          <p:nvPr/>
+        </p:nvSpPr>
+        <p:spPr>
+          <a:xfrm>
+            <a:off x="7935241" y="1256261"/>
+            <a:ext cx="3849758" cy="789323"/>
+          </a:xfrm>
+          <a:prstGeom prst="rect">
+            <a:avLst/>
+          </a:prstGeom>
+          <a:solidFill>
+            <a:schemeClr val="accent1"/>
+          </a:solidFill>
+        </p:spPr>
+        <p:txBody>
+          <a:bodyPr wrap="square" rtlCol="0">
+            <a:spAutoFit/>
+          </a:bodyPr>
+          <a:lstStyle/>
+          <a:p>
+            <a:endParaRPr lang="en-US" dirty="0"/>
+          </a:p>
+        </p:txBody>
+      </p:sp>
+      <p:sp>
+        <p:nvSpPr>
+          <p:cNvPr id="7" name="Rectangle 6">
+            <a:extLst>
+              <a:ext uri="{FF2B5EF4-FFF2-40B4-BE49-F238E27FC236}">
+                <a16:creationId xmlns:a16="http://schemas.microsoft.com/office/drawing/2014/main" id="{67FD84A3-1841-4A22-A4C7-34C102CE4942}"/>
+              </a:ext>
+            </a:extLst>
+          </p:cNvPr>
+          <p:cNvSpPr/>
+          <p:nvPr/>
+        </p:nvSpPr>
+        <p:spPr>
+          <a:xfrm>
+            <a:off x="7935843" y="1256261"/>
+            <a:ext cx="3849758" cy="4870982"/>
+          </a:xfrm>
+          <a:prstGeom prst="rect">
+            <a:avLst/>
+          </a:prstGeom>
+          <a:noFill/>
+          <a:ln>
+            <a:solidFill>
+              <a:schemeClr val="tx1"/>
+            </a:solidFill>
+          </a:ln>
+        </p:spPr>
+        <p:style>
+          <a:lnRef idx="2">
+            <a:schemeClr val="accent6"/>
+          </a:lnRef>
+          <a:fillRef idx="1">
+            <a:schemeClr val="lt1"/>
+          </a:fillRef>
+          <a:effectRef idx="0">
+            <a:schemeClr val="accent6"/>
+          </a:effectRef>
+          <a:fontRef idx="minor">
+            <a:schemeClr val="dk1"/>
+          </a:fontRef>
+        </p:style>
+        <p:txBody>
+          <a:bodyPr rtlCol="0" anchor="ctr"/>
+          <a:lstStyle/>
+          <a:p>
+            <a:pPr algn="ctr"/>
+            <a:endParaRPr lang="en-US"/>
+          </a:p>
+        </p:txBody>
+      </p:sp>
+      <p:sp>
+        <p:nvSpPr>
+          <p:cNvPr id="8" name="TextBox 7">
+            <a:extLst>
+              <a:ext uri="{FF2B5EF4-FFF2-40B4-BE49-F238E27FC236}">
+                <a16:creationId xmlns:a16="http://schemas.microsoft.com/office/drawing/2014/main" id="{74EC6CE4-6BA2-4834-BE48-F05F4CE66715}"/>
+              </a:ext>
+            </a:extLst>
+          </p:cNvPr>
+          <p:cNvSpPr txBox="1"/>
+          <p:nvPr/>
+        </p:nvSpPr>
+        <p:spPr>
+          <a:xfrm>
+            <a:off x="7934639" y="1389312"/>
+            <a:ext cx="3850361" cy="523220"/>
+          </a:xfrm>
+          <a:prstGeom prst="rect">
+            <a:avLst/>
+          </a:prstGeom>
+          <a:noFill/>
+        </p:spPr>
+        <p:txBody>
+          <a:bodyPr wrap="square" rtlCol="0">
+            <a:spAutoFit/>
+          </a:bodyPr>
+          <a:lstStyle/>
+          <a:p>
+            <a:pPr algn="ctr"/>
+            <a:r>
+              <a:rPr lang="en-US" sz="2800" dirty="0">
+                <a:solidFill>
+                  <a:schemeClr val="bg1"/>
+                </a:solidFill>
+              </a:rPr>
+              <a:t>Saved Recipes</a:t>
+            </a:r>
+          </a:p>
+        </p:txBody>
+      </p:sp>
+      <p:sp>
+        <p:nvSpPr>
+          <p:cNvPr id="9" name="TextBox 8">
+            <a:extLst>
+              <a:ext uri="{FF2B5EF4-FFF2-40B4-BE49-F238E27FC236}">
+                <a16:creationId xmlns:a16="http://schemas.microsoft.com/office/drawing/2014/main" id="{4D72A326-F8BD-48B8-B449-4ED76E923B93}"/>
+              </a:ext>
+            </a:extLst>
+          </p:cNvPr>
+          <p:cNvSpPr txBox="1"/>
+          <p:nvPr/>
+        </p:nvSpPr>
+        <p:spPr>
+          <a:xfrm>
+            <a:off x="8213757" y="2376018"/>
+            <a:ext cx="2806148" cy="646331"/>
+          </a:xfrm>
+          <a:prstGeom prst="rect">
+            <a:avLst/>
+          </a:prstGeom>
+          <a:noFill/>
+        </p:spPr>
+        <p:txBody>
+          <a:bodyPr wrap="square" rtlCol="0">
+            <a:spAutoFit/>
+          </a:bodyPr>
+          <a:lstStyle/>
+          <a:p>
+            <a:r>
+              <a:rPr lang="en-US" dirty="0"/>
+              <a:t>name</a:t>
+            </a:r>
+          </a:p>
+          <a:p>
+            <a:r>
+              <a:rPr lang="en-US" u="sng" dirty="0">
+                <a:solidFill>
+                  <a:srgbClr val="00B0F0"/>
+                </a:solidFill>
+              </a:rPr>
+              <a:t>recipe</a:t>
+            </a:r>
+          </a:p>
+        </p:txBody>
+      </p:sp>
+      <p:sp>
+        <p:nvSpPr>
+          <p:cNvPr id="11" name="TextBox 10">
+            <a:extLst>
+              <a:ext uri="{FF2B5EF4-FFF2-40B4-BE49-F238E27FC236}">
+                <a16:creationId xmlns:a16="http://schemas.microsoft.com/office/drawing/2014/main" id="{697A6D36-BF59-4624-869F-ED6A09B49DC9}"/>
+              </a:ext>
+            </a:extLst>
+          </p:cNvPr>
+          <p:cNvSpPr txBox="1"/>
+          <p:nvPr/>
+        </p:nvSpPr>
+        <p:spPr>
+          <a:xfrm>
+            <a:off x="10483585" y="4994719"/>
+            <a:ext cx="873441" cy="338554"/>
+          </a:xfrm>
+          <a:prstGeom prst="rect">
+            <a:avLst/>
+          </a:prstGeom>
+          <a:solidFill>
+            <a:schemeClr val="bg2">
+              <a:lumMod val="75000"/>
+            </a:schemeClr>
+          </a:solidFill>
+          <a:ln>
+            <a:solidFill>
+              <a:schemeClr val="bg2">
+                <a:lumMod val="25000"/>
+              </a:schemeClr>
+            </a:solidFill>
+          </a:ln>
+        </p:spPr>
+        <p:txBody>
+          <a:bodyPr wrap="square" rtlCol="0">
+            <a:spAutoFit/>
+          </a:bodyPr>
+          <a:lstStyle/>
+          <a:p>
+            <a:pPr algn="ctr"/>
+            <a:r>
+              <a:rPr lang="en-US" sz="1600" dirty="0"/>
+              <a:t>Profile</a:t>
+            </a:r>
+            <a:endParaRPr lang="en-US" dirty="0"/>
+          </a:p>
+        </p:txBody>
+      </p:sp>
+      <p:sp>
+        <p:nvSpPr>
+          <p:cNvPr id="12" name="TextBox 11">
+            <a:extLst>
+              <a:ext uri="{FF2B5EF4-FFF2-40B4-BE49-F238E27FC236}">
+                <a16:creationId xmlns:a16="http://schemas.microsoft.com/office/drawing/2014/main" id="{FC4E73C9-A713-4582-9EEB-A7CBC23CE97F}"/>
+              </a:ext>
+            </a:extLst>
+          </p:cNvPr>
+          <p:cNvSpPr txBox="1"/>
+          <p:nvPr/>
+        </p:nvSpPr>
+        <p:spPr>
+          <a:xfrm>
+            <a:off x="8213757" y="5007489"/>
+            <a:ext cx="826539" cy="369332"/>
+          </a:xfrm>
+          <a:prstGeom prst="rect">
+            <a:avLst/>
+          </a:prstGeom>
+          <a:solidFill>
+            <a:schemeClr val="bg1"/>
+          </a:solidFill>
+          <a:ln>
+            <a:solidFill>
+              <a:schemeClr val="bg2">
+                <a:lumMod val="25000"/>
+              </a:schemeClr>
+            </a:solidFill>
+          </a:ln>
+        </p:spPr>
+        <p:txBody>
+          <a:bodyPr wrap="square" rtlCol="0">
+            <a:spAutoFit/>
+          </a:bodyPr>
+          <a:lstStyle/>
+          <a:p>
+            <a:pPr algn="ctr"/>
+            <a:r>
+              <a:rPr lang="en-US" dirty="0"/>
+              <a:t>Home</a:t>
+            </a:r>
+          </a:p>
+        </p:txBody>
+      </p:sp>
+      <p:sp>
+        <p:nvSpPr>
+          <p:cNvPr id="13" name="Rectangle 12">
+            <a:extLst>
+              <a:ext uri="{FF2B5EF4-FFF2-40B4-BE49-F238E27FC236}">
+                <a16:creationId xmlns:a16="http://schemas.microsoft.com/office/drawing/2014/main" id="{2EA7338E-40A2-4A83-A3D9-18E8CC1E5B86}"/>
+              </a:ext>
+            </a:extLst>
+          </p:cNvPr>
+          <p:cNvSpPr/>
+          <p:nvPr/>
+        </p:nvSpPr>
+        <p:spPr>
+          <a:xfrm>
+            <a:off x="8817305" y="5639771"/>
+            <a:ext cx="1934727" cy="369332"/>
+          </a:xfrm>
+          <a:prstGeom prst="rect">
+            <a:avLst/>
+          </a:prstGeom>
+        </p:spPr>
+        <p:txBody>
+          <a:bodyPr wrap="square">
+            <a:spAutoFit/>
+          </a:bodyPr>
+          <a:lstStyle/>
+          <a:p>
+            <a:pPr algn="ctr"/>
+            <a:r>
+              <a:rPr lang="en-US" dirty="0">
+                <a:solidFill>
+                  <a:schemeClr val="bg1"/>
+                </a:solidFill>
+              </a:rPr>
+              <a:t>craving it!</a:t>
+            </a:r>
+          </a:p>
+        </p:txBody>
+      </p:sp>
+      <p:sp>
+        <p:nvSpPr>
+          <p:cNvPr id="14" name="TextBox 13">
+            <a:extLst>
+              <a:ext uri="{FF2B5EF4-FFF2-40B4-BE49-F238E27FC236}">
+                <a16:creationId xmlns:a16="http://schemas.microsoft.com/office/drawing/2014/main" id="{1AF83908-9916-4385-B893-E58561B3C3BD}"/>
+              </a:ext>
+            </a:extLst>
+          </p:cNvPr>
+          <p:cNvSpPr txBox="1"/>
+          <p:nvPr/>
+        </p:nvSpPr>
+        <p:spPr>
+          <a:xfrm>
+            <a:off x="8224710" y="3070319"/>
+            <a:ext cx="2806148" cy="646331"/>
+          </a:xfrm>
+          <a:prstGeom prst="rect">
+            <a:avLst/>
+          </a:prstGeom>
+          <a:noFill/>
+        </p:spPr>
+        <p:txBody>
+          <a:bodyPr wrap="square" rtlCol="0">
+            <a:spAutoFit/>
+          </a:bodyPr>
+          <a:lstStyle/>
+          <a:p>
+            <a:r>
+              <a:rPr lang="en-US" dirty="0"/>
+              <a:t>name</a:t>
+            </a:r>
+          </a:p>
+          <a:p>
+            <a:r>
+              <a:rPr lang="en-US" u="sng" dirty="0">
+                <a:solidFill>
+                  <a:srgbClr val="00B0F0"/>
+                </a:solidFill>
+              </a:rPr>
+              <a:t>recipe</a:t>
+            </a:r>
+          </a:p>
+        </p:txBody>
+      </p:sp>
+      <p:sp>
+        <p:nvSpPr>
+          <p:cNvPr id="15" name="TextBox 14">
+            <a:extLst>
+              <a:ext uri="{FF2B5EF4-FFF2-40B4-BE49-F238E27FC236}">
+                <a16:creationId xmlns:a16="http://schemas.microsoft.com/office/drawing/2014/main" id="{D7260EFA-C078-4B1B-8F7B-49BEF0E8C9E5}"/>
+              </a:ext>
+            </a:extLst>
+          </p:cNvPr>
+          <p:cNvSpPr txBox="1"/>
+          <p:nvPr/>
+        </p:nvSpPr>
+        <p:spPr>
+          <a:xfrm>
+            <a:off x="8224710" y="3746947"/>
+            <a:ext cx="2806148" cy="646331"/>
+          </a:xfrm>
+          <a:prstGeom prst="rect">
+            <a:avLst/>
+          </a:prstGeom>
+          <a:noFill/>
+        </p:spPr>
+        <p:txBody>
+          <a:bodyPr wrap="square" rtlCol="0">
+            <a:spAutoFit/>
+          </a:bodyPr>
+          <a:lstStyle/>
+          <a:p>
+            <a:r>
+              <a:rPr lang="en-US" dirty="0"/>
+              <a:t>name</a:t>
+            </a:r>
+          </a:p>
+          <a:p>
+            <a:r>
+              <a:rPr lang="en-US" u="sng" dirty="0">
+                <a:solidFill>
+                  <a:srgbClr val="00B0F0"/>
+                </a:solidFill>
+              </a:rPr>
+              <a:t>recipe</a:t>
+            </a:r>
           </a:p>
         </p:txBody>
       </p:sp>
@@ -27004,7 +27978,7 @@
             </a:r>
             <a:r>
               <a:rPr lang="en-US" dirty="0"/>
-              <a:t>find out how I can make or go to a recipe to cook</a:t>
+              <a:t>find out how I can make a specific dish</a:t>
             </a:r>
             <a:br>
               <a:rPr lang="en-US" dirty="0"/>
@@ -27024,15 +27998,7 @@
           <a:p>
             <a:r>
               <a:rPr lang="en-US" dirty="0"/>
-              <a:t>MVP:   User can select a type of cuisine for a </a:t>
-            </a:r>
-            <a:r>
-              <a:rPr lang="en-US" dirty="0" err="1"/>
-              <a:t>receipe</a:t>
-            </a:r>
-            <a:r>
-              <a:rPr lang="en-US" dirty="0"/>
-              <a:t>.  User can navigate back to the main welcome page.</a:t>
+              <a:t>MVP:   User can select a type of cuisine for a recipe.  User can navigate back to the main welcome page.</a:t>
             </a:r>
           </a:p>
           <a:p>
@@ -27979,7 +28945,7 @@
         <p:spPr>
           <a:xfrm>
             <a:off x="916391" y="928053"/>
-            <a:ext cx="6263254" cy="5355312"/>
+            <a:ext cx="6263254" cy="5078313"/>
           </a:xfrm>
           <a:prstGeom prst="rect">
             <a:avLst/>
@@ -28018,7 +28984,7 @@
             </a:r>
             <a:r>
               <a:rPr lang="en-US" dirty="0"/>
-              <a:t>find out how I can make or go to a restaurant that serves a specific dish</a:t>
+              <a:t>find a restaurant that serves a specific dish</a:t>
             </a:r>
             <a:br>
               <a:rPr lang="en-US" dirty="0"/>

</xml_diff>